<commit_message>
Alterada maquete, atualizado diagrama de use cases e adicionado um diagrama de sequência
</commit_message>
<xml_diff>
--- a/Arquivo/Maquete.pptx
+++ b/Arquivo/Maquete.pptx
@@ -104,7 +104,16 @@
       </a:defRPr>
     </a:lvl9pPr>
   </p:defaultTextStyle>
+  <p:extLst>
+    <p:ext uri="{EFAFB233-063F-42B5-8137-9DF3F51BA10A}">
+      <p15:sldGuideLst xmlns:p15="http://schemas.microsoft.com/office/powerpoint/2012/main"/>
+    </p:ext>
+  </p:extLst>
 </p:presentation>
+</file>
+
+<file path=ppt/revisionInfo.xml><?xml version="1.0" encoding="utf-8"?>
+<p1510:revInfo xmlns:a="http://schemas.openxmlformats.org/drawingml/2006/main" xmlns:r="http://schemas.openxmlformats.org/officeDocument/2006/relationships" xmlns:p1510="http://schemas.microsoft.com/office/powerpoint/2015/10/main"/>
 </file>
 
 <file path=ppt/slideLayouts/slideLayout1.xml><?xml version="1.0" encoding="utf-8"?>
@@ -236,7 +245,7 @@
           <a:p>
             <a:fld id="{EA1E8F9B-FDF6-4BED-BCBA-9201990DA2A7}" type="datetimeFigureOut">
               <a:rPr lang="pt-PT" smtClean="0"/>
-              <a:t>19/04/2017</a:t>
+              <a:t>28/04/2017</a:t>
             </a:fld>
             <a:endParaRPr lang="pt-PT"/>
           </a:p>
@@ -404,7 +413,7 @@
           <a:p>
             <a:fld id="{EA1E8F9B-FDF6-4BED-BCBA-9201990DA2A7}" type="datetimeFigureOut">
               <a:rPr lang="pt-PT" smtClean="0"/>
-              <a:t>19/04/2017</a:t>
+              <a:t>28/04/2017</a:t>
             </a:fld>
             <a:endParaRPr lang="pt-PT"/>
           </a:p>
@@ -582,7 +591,7 @@
           <a:p>
             <a:fld id="{EA1E8F9B-FDF6-4BED-BCBA-9201990DA2A7}" type="datetimeFigureOut">
               <a:rPr lang="pt-PT" smtClean="0"/>
-              <a:t>19/04/2017</a:t>
+              <a:t>28/04/2017</a:t>
             </a:fld>
             <a:endParaRPr lang="pt-PT"/>
           </a:p>
@@ -750,7 +759,7 @@
           <a:p>
             <a:fld id="{EA1E8F9B-FDF6-4BED-BCBA-9201990DA2A7}" type="datetimeFigureOut">
               <a:rPr lang="pt-PT" smtClean="0"/>
-              <a:t>19/04/2017</a:t>
+              <a:t>28/04/2017</a:t>
             </a:fld>
             <a:endParaRPr lang="pt-PT"/>
           </a:p>
@@ -995,7 +1004,7 @@
           <a:p>
             <a:fld id="{EA1E8F9B-FDF6-4BED-BCBA-9201990DA2A7}" type="datetimeFigureOut">
               <a:rPr lang="pt-PT" smtClean="0"/>
-              <a:t>19/04/2017</a:t>
+              <a:t>28/04/2017</a:t>
             </a:fld>
             <a:endParaRPr lang="pt-PT"/>
           </a:p>
@@ -1224,7 +1233,7 @@
           <a:p>
             <a:fld id="{EA1E8F9B-FDF6-4BED-BCBA-9201990DA2A7}" type="datetimeFigureOut">
               <a:rPr lang="pt-PT" smtClean="0"/>
-              <a:t>19/04/2017</a:t>
+              <a:t>28/04/2017</a:t>
             </a:fld>
             <a:endParaRPr lang="pt-PT"/>
           </a:p>
@@ -1588,7 +1597,7 @@
           <a:p>
             <a:fld id="{EA1E8F9B-FDF6-4BED-BCBA-9201990DA2A7}" type="datetimeFigureOut">
               <a:rPr lang="pt-PT" smtClean="0"/>
-              <a:t>19/04/2017</a:t>
+              <a:t>28/04/2017</a:t>
             </a:fld>
             <a:endParaRPr lang="pt-PT"/>
           </a:p>
@@ -1705,7 +1714,7 @@
           <a:p>
             <a:fld id="{EA1E8F9B-FDF6-4BED-BCBA-9201990DA2A7}" type="datetimeFigureOut">
               <a:rPr lang="pt-PT" smtClean="0"/>
-              <a:t>19/04/2017</a:t>
+              <a:t>28/04/2017</a:t>
             </a:fld>
             <a:endParaRPr lang="pt-PT"/>
           </a:p>
@@ -1800,7 +1809,7 @@
           <a:p>
             <a:fld id="{EA1E8F9B-FDF6-4BED-BCBA-9201990DA2A7}" type="datetimeFigureOut">
               <a:rPr lang="pt-PT" smtClean="0"/>
-              <a:t>19/04/2017</a:t>
+              <a:t>28/04/2017</a:t>
             </a:fld>
             <a:endParaRPr lang="pt-PT"/>
           </a:p>
@@ -2075,7 +2084,7 @@
           <a:p>
             <a:fld id="{EA1E8F9B-FDF6-4BED-BCBA-9201990DA2A7}" type="datetimeFigureOut">
               <a:rPr lang="pt-PT" smtClean="0"/>
-              <a:t>19/04/2017</a:t>
+              <a:t>28/04/2017</a:t>
             </a:fld>
             <a:endParaRPr lang="pt-PT"/>
           </a:p>
@@ -2327,7 +2336,7 @@
           <a:p>
             <a:fld id="{EA1E8F9B-FDF6-4BED-BCBA-9201990DA2A7}" type="datetimeFigureOut">
               <a:rPr lang="pt-PT" smtClean="0"/>
-              <a:t>19/04/2017</a:t>
+              <a:t>28/04/2017</a:t>
             </a:fld>
             <a:endParaRPr lang="pt-PT"/>
           </a:p>
@@ -2538,7 +2547,7 @@
           <a:p>
             <a:fld id="{EA1E8F9B-FDF6-4BED-BCBA-9201990DA2A7}" type="datetimeFigureOut">
               <a:rPr lang="pt-PT" smtClean="0"/>
-              <a:t>19/04/2017</a:t>
+              <a:t>28/04/2017</a:t>
             </a:fld>
             <a:endParaRPr lang="pt-PT"/>
           </a:p>
@@ -3056,8 +3065,8 @@
         </p:nvSpPr>
         <p:spPr>
           <a:xfrm>
-            <a:off x="2893394" y="2198586"/>
-            <a:ext cx="1127850" cy="923330"/>
+            <a:off x="2893393" y="2198586"/>
+            <a:ext cx="1401769" cy="646331"/>
           </a:xfrm>
           <a:prstGeom prst="rect">
             <a:avLst/>
@@ -3086,7 +3095,7 @@
             <a:pPr algn="ctr"/>
             <a:r>
               <a:rPr lang="pt-PT" dirty="0"/>
-              <a:t>Módulo de Conta de Cliente</a:t>
+              <a:t>Registo e Autenticação</a:t>
             </a:r>
           </a:p>
         </p:txBody>
@@ -3099,8 +3108,8 @@
         </p:nvSpPr>
         <p:spPr>
           <a:xfrm>
-            <a:off x="3403774" y="3287294"/>
-            <a:ext cx="1234940" cy="923330"/>
+            <a:off x="2976807" y="3391661"/>
+            <a:ext cx="1234940" cy="646331"/>
           </a:xfrm>
           <a:prstGeom prst="rect">
             <a:avLst/>
@@ -3129,7 +3138,7 @@
             <a:pPr algn="ctr"/>
             <a:r>
               <a:rPr lang="pt-PT" dirty="0"/>
-              <a:t>Módulo de Conta de Negócio</a:t>
+              <a:t>Gestão de Conta</a:t>
             </a:r>
           </a:p>
         </p:txBody>
@@ -3142,8 +3151,8 @@
         </p:nvSpPr>
         <p:spPr>
           <a:xfrm>
-            <a:off x="5527983" y="3668660"/>
-            <a:ext cx="2796086" cy="369332"/>
+            <a:off x="4963643" y="3614028"/>
+            <a:ext cx="2049535" cy="369332"/>
           </a:xfrm>
           <a:prstGeom prst="rect">
             <a:avLst/>
@@ -3172,7 +3181,7 @@
             <a:pPr algn="ctr"/>
             <a:r>
               <a:rPr lang="pt-PT" dirty="0"/>
-              <a:t>Módulo de Recomendações</a:t>
+              <a:t>Pedidos e Consultas</a:t>
             </a:r>
           </a:p>
         </p:txBody>
@@ -3185,7 +3194,7 @@
         </p:nvSpPr>
         <p:spPr>
           <a:xfrm>
-            <a:off x="7587643" y="2530011"/>
+            <a:off x="7503753" y="3345229"/>
             <a:ext cx="2060837" cy="646331"/>
           </a:xfrm>
           <a:prstGeom prst="rect">
@@ -3214,37 +3223,9 @@
           <a:p>
             <a:pPr algn="ctr"/>
             <a:r>
-              <a:rPr lang="pt-PT" dirty="0"/>
-              <a:t>Módulo de Partilha</a:t>
-            </a:r>
-            <a:r>
-              <a:rPr lang="en-US" dirty="0"/>
-              <a:t> </a:t>
-            </a:r>
-          </a:p>
-          <a:p>
-            <a:pPr algn="ctr"/>
-            <a:r>
-              <a:rPr lang="en-US" dirty="0"/>
-              <a:t>(</a:t>
-            </a:r>
-            <a:r>
-              <a:rPr lang="pt-PT" dirty="0"/>
-              <a:t>Redes</a:t>
-            </a:r>
-            <a:r>
-              <a:rPr lang="en-US" dirty="0"/>
-              <a:t> </a:t>
-            </a:r>
-            <a:r>
-              <a:rPr lang="pt-PT" dirty="0"/>
-              <a:t>Sociais</a:t>
-            </a:r>
-            <a:r>
-              <a:rPr lang="en-US" dirty="0"/>
-              <a:t>)</a:t>
-            </a:r>
-            <a:endParaRPr lang="pt-PT" dirty="0"/>
+              <a:rPr lang="pt-PT"/>
+              <a:t>Classificações e Partilha</a:t>
+            </a:r>
           </a:p>
         </p:txBody>
       </p:sp>
@@ -3286,7 +3267,7 @@
             <a:pPr algn="ctr"/>
             <a:r>
               <a:rPr lang="pt-PT" dirty="0"/>
-              <a:t>Módulos de Input (Texto e Voz)</a:t>
+              <a:t>Preferências e Não Preferências</a:t>
             </a:r>
           </a:p>
         </p:txBody>
@@ -3482,7 +3463,7 @@
         </p:nvSpPr>
         <p:spPr>
           <a:xfrm>
-            <a:off x="4148241" y="1031127"/>
+            <a:off x="4007630" y="1125336"/>
             <a:ext cx="866712" cy="369332"/>
           </a:xfrm>
           <a:prstGeom prst="rect">
@@ -3528,7 +3509,7 @@
         </p:nvSpPr>
         <p:spPr>
           <a:xfrm>
-            <a:off x="3874737" y="389754"/>
+            <a:off x="3734126" y="503189"/>
             <a:ext cx="1413720" cy="369332"/>
           </a:xfrm>
           <a:prstGeom prst="rect">
@@ -3574,7 +3555,7 @@
         </p:nvSpPr>
         <p:spPr>
           <a:xfrm>
-            <a:off x="7097155" y="963968"/>
+            <a:off x="7226143" y="961923"/>
             <a:ext cx="1203727" cy="369332"/>
           </a:xfrm>
           <a:prstGeom prst="rect">
@@ -3729,7 +3710,7 @@
         </p:nvSpPr>
         <p:spPr>
           <a:xfrm>
-            <a:off x="5689205" y="970189"/>
+            <a:off x="7327614" y="332324"/>
             <a:ext cx="1000787" cy="369332"/>
           </a:xfrm>
           <a:prstGeom prst="rect">
@@ -3775,7 +3756,7 @@
         </p:nvSpPr>
         <p:spPr>
           <a:xfrm>
-            <a:off x="5519896" y="389754"/>
+            <a:off x="5568701" y="303763"/>
             <a:ext cx="1339406" cy="369332"/>
           </a:xfrm>
           <a:prstGeom prst="rect">
@@ -3808,44 +3789,8 @@
         </p:nvCxnSpPr>
         <p:spPr>
           <a:xfrm flipV="1">
-            <a:off x="4581597" y="759086"/>
-            <a:ext cx="0" cy="272041"/>
-          </a:xfrm>
-          <a:prstGeom prst="straightConnector1">
-            <a:avLst/>
-          </a:prstGeom>
-          <a:ln>
-            <a:tailEnd type="triangle"/>
-          </a:ln>
-        </p:spPr>
-        <p:style>
-          <a:lnRef idx="1">
-            <a:schemeClr val="dk1"/>
-          </a:lnRef>
-          <a:fillRef idx="0">
-            <a:schemeClr val="dk1"/>
-          </a:fillRef>
-          <a:effectRef idx="0">
-            <a:schemeClr val="dk1"/>
-          </a:effectRef>
-          <a:fontRef idx="minor">
-            <a:schemeClr val="tx1"/>
-          </a:fontRef>
-        </p:style>
-      </p:cxnSp>
-      <p:cxnSp>
-        <p:nvCxnSpPr>
-          <p:cNvPr id="90" name="Conexão reta unidirecional 89"/>
-          <p:cNvCxnSpPr>
-            <a:stCxn id="84" idx="2"/>
-            <a:endCxn id="79" idx="0"/>
-          </p:cNvCxnSpPr>
-          <p:nvPr/>
-        </p:nvCxnSpPr>
-        <p:spPr>
-          <a:xfrm>
-            <a:off x="6189599" y="759086"/>
-            <a:ext cx="0" cy="211103"/>
+            <a:off x="4440986" y="872521"/>
+            <a:ext cx="0" cy="252815"/>
           </a:xfrm>
           <a:prstGeom prst="straightConnector1">
             <a:avLst/>
@@ -3873,15 +3818,16 @@
         <p:nvCxnSpPr>
           <p:cNvPr id="93" name="Conexão reta unidirecional 92"/>
           <p:cNvCxnSpPr>
-            <a:stCxn id="79" idx="3"/>
-            <a:endCxn id="72" idx="1"/>
+            <a:cxnSpLocks/>
+            <a:stCxn id="79" idx="2"/>
+            <a:endCxn id="72" idx="0"/>
           </p:cNvCxnSpPr>
           <p:nvPr/>
         </p:nvCxnSpPr>
         <p:spPr>
-          <a:xfrm flipV="1">
-            <a:off x="6689992" y="1148634"/>
-            <a:ext cx="407163" cy="6221"/>
+          <a:xfrm flipH="1">
+            <a:off x="7828007" y="701656"/>
+            <a:ext cx="1" cy="260267"/>
           </a:xfrm>
           <a:prstGeom prst="straightConnector1">
             <a:avLst/>
@@ -3915,9 +3861,9 @@
           <p:nvPr/>
         </p:nvCxnSpPr>
         <p:spPr>
-          <a:xfrm>
-            <a:off x="5288457" y="574420"/>
-            <a:ext cx="231439" cy="0"/>
+          <a:xfrm flipV="1">
+            <a:off x="5147846" y="488429"/>
+            <a:ext cx="420855" cy="199426"/>
           </a:xfrm>
           <a:prstGeom prst="straightConnector1">
             <a:avLst/>
@@ -3941,6 +3887,115 @@
           </a:fontRef>
         </p:style>
       </p:cxnSp>
+      <p:sp>
+        <p:nvSpPr>
+          <p:cNvPr id="37" name="CaixaDeTexto 36"/>
+          <p:cNvSpPr txBox="1"/>
+          <p:nvPr/>
+        </p:nvSpPr>
+        <p:spPr>
+          <a:xfrm>
+            <a:off x="5559828" y="760093"/>
+            <a:ext cx="1456809" cy="369332"/>
+          </a:xfrm>
+          <a:prstGeom prst="rect">
+            <a:avLst/>
+          </a:prstGeom>
+          <a:noFill/>
+        </p:spPr>
+        <p:txBody>
+          <a:bodyPr wrap="none" rtlCol="0">
+            <a:spAutoFit/>
+          </a:bodyPr>
+          <a:lstStyle/>
+          <a:p>
+            <a:r>
+              <a:rPr lang="pt-PT" dirty="0"/>
+              <a:t>Classificações</a:t>
+            </a:r>
+          </a:p>
+        </p:txBody>
+      </p:sp>
+      <p:cxnSp>
+        <p:nvCxnSpPr>
+          <p:cNvPr id="38" name="Conexão reta unidirecional 37"/>
+          <p:cNvCxnSpPr>
+            <a:cxnSpLocks/>
+            <a:stCxn id="61" idx="3"/>
+            <a:endCxn id="37" idx="1"/>
+          </p:cNvCxnSpPr>
+          <p:nvPr/>
+        </p:nvCxnSpPr>
+        <p:spPr>
+          <a:xfrm>
+            <a:off x="5147846" y="687855"/>
+            <a:ext cx="411982" cy="256904"/>
+          </a:xfrm>
+          <a:prstGeom prst="straightConnector1">
+            <a:avLst/>
+          </a:prstGeom>
+          <a:ln>
+            <a:tailEnd type="triangle"/>
+          </a:ln>
+        </p:spPr>
+        <p:style>
+          <a:lnRef idx="1">
+            <a:schemeClr val="dk1"/>
+          </a:lnRef>
+          <a:fillRef idx="0">
+            <a:schemeClr val="dk1"/>
+          </a:fillRef>
+          <a:effectRef idx="0">
+            <a:schemeClr val="dk1"/>
+          </a:effectRef>
+          <a:fontRef idx="minor">
+            <a:schemeClr val="tx1"/>
+          </a:fontRef>
+        </p:style>
+      </p:cxnSp>
+      <p:sp>
+        <p:nvSpPr>
+          <p:cNvPr id="43" name="CaixaDeTexto 42"/>
+          <p:cNvSpPr txBox="1"/>
+          <p:nvPr/>
+        </p:nvSpPr>
+        <p:spPr>
+          <a:xfrm>
+            <a:off x="7503752" y="2317929"/>
+            <a:ext cx="2060837" cy="369332"/>
+          </a:xfrm>
+          <a:prstGeom prst="rect">
+            <a:avLst/>
+          </a:prstGeom>
+        </p:spPr>
+        <p:style>
+          <a:lnRef idx="2">
+            <a:schemeClr val="dk1"/>
+          </a:lnRef>
+          <a:fillRef idx="1">
+            <a:schemeClr val="lt1"/>
+          </a:fillRef>
+          <a:effectRef idx="0">
+            <a:schemeClr val="dk1"/>
+          </a:effectRef>
+          <a:fontRef idx="minor">
+            <a:schemeClr val="dk1"/>
+          </a:fontRef>
+        </p:style>
+        <p:txBody>
+          <a:bodyPr wrap="square" rtlCol="0">
+            <a:spAutoFit/>
+          </a:bodyPr>
+          <a:lstStyle/>
+          <a:p>
+            <a:pPr algn="ctr"/>
+            <a:r>
+              <a:rPr lang="pt-PT" dirty="0"/>
+              <a:t>Gestão de Alimento</a:t>
+            </a:r>
+          </a:p>
+        </p:txBody>
+      </p:sp>
     </p:spTree>
     <p:extLst>
       <p:ext uri="{BB962C8B-B14F-4D97-AF65-F5344CB8AC3E}">

</xml_diff>